<commit_message>
commit final* work before starting on poster
most features work in basic form for diagnosis:

1. USER INPUT
2. DIAGNOSIS OUTPUT
3. LIME EXPLANATION
4. RELIABILITY OF DIAGNOSIS (ACCURACY/CONFIDENCE)

---

after poster is complete, to work on the home and help page as well as refining model to increase the accuracy (already handled data pre-processing [only improvement could make is feature contribution])
</commit_message>
<xml_diff>
--- a/Diabetes Prediction with Machine Learning (ML).pptx
+++ b/Diabetes Prediction with Machine Learning (ML).pptx
@@ -5,7 +5,7 @@
     <p:sldMasterId id="2147483648" r:id="rId1"/>
   </p:sldMasterIdLst>
   <p:notesMasterIdLst>
-    <p:notesMasterId r:id="rId35"/>
+    <p:notesMasterId r:id="rId37"/>
   </p:notesMasterIdLst>
   <p:sldIdLst>
     <p:sldId id="256" r:id="rId2"/>
@@ -34,13 +34,15 @@
     <p:sldId id="273" r:id="rId25"/>
     <p:sldId id="274" r:id="rId26"/>
     <p:sldId id="275" r:id="rId27"/>
-    <p:sldId id="276" r:id="rId28"/>
-    <p:sldId id="277" r:id="rId29"/>
-    <p:sldId id="278" r:id="rId30"/>
-    <p:sldId id="279" r:id="rId31"/>
-    <p:sldId id="280" r:id="rId32"/>
-    <p:sldId id="281" r:id="rId33"/>
-    <p:sldId id="282" r:id="rId34"/>
+    <p:sldId id="298" r:id="rId28"/>
+    <p:sldId id="297" r:id="rId29"/>
+    <p:sldId id="296" r:id="rId30"/>
+    <p:sldId id="277" r:id="rId31"/>
+    <p:sldId id="278" r:id="rId32"/>
+    <p:sldId id="279" r:id="rId33"/>
+    <p:sldId id="280" r:id="rId34"/>
+    <p:sldId id="281" r:id="rId35"/>
+    <p:sldId id="282" r:id="rId36"/>
   </p:sldIdLst>
   <p:sldSz cx="12192000" cy="6858000"/>
   <p:notesSz cx="6858000" cy="9144000"/>
@@ -518,7 +520,7 @@
           <a:p>
             <a:fld id="{4F162202-4602-4A80-AA5A-C601C1519D47}" type="datetimeFigureOut">
               <a:rPr lang="en-GB" smtClean="0"/>
-              <a:t>16/02/2025</a:t>
+              <a:t>17/02/2025</a:t>
             </a:fld>
             <a:endParaRPr lang="en-GB"/>
           </a:p>
@@ -1187,7 +1189,7 @@
           <a:p>
             <a:fld id="{AF8979C9-B5CC-471D-815B-CFB8B5F67837}" type="datetimeFigureOut">
               <a:rPr lang="en-GB" smtClean="0"/>
-              <a:t>16/02/2025</a:t>
+              <a:t>17/02/2025</a:t>
             </a:fld>
             <a:endParaRPr lang="en-GB"/>
           </a:p>
@@ -1387,7 +1389,7 @@
           <a:p>
             <a:fld id="{AF8979C9-B5CC-471D-815B-CFB8B5F67837}" type="datetimeFigureOut">
               <a:rPr lang="en-GB" smtClean="0"/>
-              <a:t>16/02/2025</a:t>
+              <a:t>17/02/2025</a:t>
             </a:fld>
             <a:endParaRPr lang="en-GB"/>
           </a:p>
@@ -1597,7 +1599,7 @@
           <a:p>
             <a:fld id="{AF8979C9-B5CC-471D-815B-CFB8B5F67837}" type="datetimeFigureOut">
               <a:rPr lang="en-GB" smtClean="0"/>
-              <a:t>16/02/2025</a:t>
+              <a:t>17/02/2025</a:t>
             </a:fld>
             <a:endParaRPr lang="en-GB"/>
           </a:p>
@@ -1797,7 +1799,7 @@
           <a:p>
             <a:fld id="{AF8979C9-B5CC-471D-815B-CFB8B5F67837}" type="datetimeFigureOut">
               <a:rPr lang="en-GB" smtClean="0"/>
-              <a:t>16/02/2025</a:t>
+              <a:t>17/02/2025</a:t>
             </a:fld>
             <a:endParaRPr lang="en-GB"/>
           </a:p>
@@ -2073,7 +2075,7 @@
           <a:p>
             <a:fld id="{AF8979C9-B5CC-471D-815B-CFB8B5F67837}" type="datetimeFigureOut">
               <a:rPr lang="en-GB" smtClean="0"/>
-              <a:t>16/02/2025</a:t>
+              <a:t>17/02/2025</a:t>
             </a:fld>
             <a:endParaRPr lang="en-GB"/>
           </a:p>
@@ -2341,7 +2343,7 @@
           <a:p>
             <a:fld id="{AF8979C9-B5CC-471D-815B-CFB8B5F67837}" type="datetimeFigureOut">
               <a:rPr lang="en-GB" smtClean="0"/>
-              <a:t>16/02/2025</a:t>
+              <a:t>17/02/2025</a:t>
             </a:fld>
             <a:endParaRPr lang="en-GB"/>
           </a:p>
@@ -2756,7 +2758,7 @@
           <a:p>
             <a:fld id="{AF8979C9-B5CC-471D-815B-CFB8B5F67837}" type="datetimeFigureOut">
               <a:rPr lang="en-GB" smtClean="0"/>
-              <a:t>16/02/2025</a:t>
+              <a:t>17/02/2025</a:t>
             </a:fld>
             <a:endParaRPr lang="en-GB"/>
           </a:p>
@@ -2898,7 +2900,7 @@
           <a:p>
             <a:fld id="{AF8979C9-B5CC-471D-815B-CFB8B5F67837}" type="datetimeFigureOut">
               <a:rPr lang="en-GB" smtClean="0"/>
-              <a:t>16/02/2025</a:t>
+              <a:t>17/02/2025</a:t>
             </a:fld>
             <a:endParaRPr lang="en-GB"/>
           </a:p>
@@ -3011,7 +3013,7 @@
           <a:p>
             <a:fld id="{AF8979C9-B5CC-471D-815B-CFB8B5F67837}" type="datetimeFigureOut">
               <a:rPr lang="en-GB" smtClean="0"/>
-              <a:t>16/02/2025</a:t>
+              <a:t>17/02/2025</a:t>
             </a:fld>
             <a:endParaRPr lang="en-GB"/>
           </a:p>
@@ -3324,7 +3326,7 @@
           <a:p>
             <a:fld id="{AF8979C9-B5CC-471D-815B-CFB8B5F67837}" type="datetimeFigureOut">
               <a:rPr lang="en-GB" smtClean="0"/>
-              <a:t>16/02/2025</a:t>
+              <a:t>17/02/2025</a:t>
             </a:fld>
             <a:endParaRPr lang="en-GB"/>
           </a:p>
@@ -3613,7 +3615,7 @@
           <a:p>
             <a:fld id="{AF8979C9-B5CC-471D-815B-CFB8B5F67837}" type="datetimeFigureOut">
               <a:rPr lang="en-GB" smtClean="0"/>
-              <a:t>16/02/2025</a:t>
+              <a:t>17/02/2025</a:t>
             </a:fld>
             <a:endParaRPr lang="en-GB"/>
           </a:p>
@@ -3856,7 +3858,7 @@
           <a:p>
             <a:fld id="{AF8979C9-B5CC-471D-815B-CFB8B5F67837}" type="datetimeFigureOut">
               <a:rPr lang="en-GB" smtClean="0"/>
-              <a:t>16/02/2025</a:t>
+              <a:t>17/02/2025</a:t>
             </a:fld>
             <a:endParaRPr lang="en-GB"/>
           </a:p>
@@ -7484,7 +7486,7 @@
           <p:cNvPr id="2" name="Title 1">
             <a:extLst>
               <a:ext uri="{FF2B5EF4-FFF2-40B4-BE49-F238E27FC236}">
-                <a16:creationId xmlns:a16="http://schemas.microsoft.com/office/drawing/2014/main" id="{230DB2D1-5376-9394-A2EE-84484AD267A1}"/>
+                <a16:creationId xmlns:a16="http://schemas.microsoft.com/office/drawing/2014/main" id="{52395A95-3CDF-0D77-D2E5-81A9D03B828F}"/>
               </a:ext>
             </a:extLst>
           </p:cNvPr>
@@ -7501,10 +7503,8 @@
           <a:lstStyle/>
           <a:p>
             <a:r>
-              <a:rPr lang="en-GB" dirty="0">
-                <a:latin typeface="Jumping Unicorn" panose="02000600000000000000" pitchFamily="2" charset="0"/>
-              </a:rPr>
-              <a:t>Workflow</a:t>
+              <a:rPr lang="en-GB" dirty="0"/>
+              <a:t>Use Case Diagram</a:t>
             </a:r>
           </a:p>
         </p:txBody>
@@ -7514,7 +7514,7 @@
           <p:cNvPr id="3" name="Content Placeholder 2">
             <a:extLst>
               <a:ext uri="{FF2B5EF4-FFF2-40B4-BE49-F238E27FC236}">
-                <a16:creationId xmlns:a16="http://schemas.microsoft.com/office/drawing/2014/main" id="{4B1D5A2D-3F5F-A625-F52F-F221D1004128}"/>
+                <a16:creationId xmlns:a16="http://schemas.microsoft.com/office/drawing/2014/main" id="{894DD074-562F-DA1A-5029-2F11E74FDB7F}"/>
               </a:ext>
             </a:extLst>
           </p:cNvPr>
@@ -7525,22 +7525,57 @@
             <p:ph idx="1"/>
           </p:nvPr>
         </p:nvSpPr>
-        <p:spPr/>
+        <p:spPr>
+          <a:xfrm>
+            <a:off x="838200" y="1825625"/>
+            <a:ext cx="5886450" cy="4351338"/>
+          </a:xfrm>
+        </p:spPr>
         <p:txBody>
           <a:bodyPr/>
           <a:lstStyle/>
           <a:p>
-            <a:pPr marL="0" indent="0">
-              <a:buNone/>
-            </a:pPr>
-            <a:endParaRPr lang="en-GB" dirty="0"/>
-          </a:p>
-        </p:txBody>
-      </p:sp>
+            <a:endParaRPr lang="en-GB" dirty="0">
+              <a:latin typeface="Times New Roman" panose="02020603050405020304" pitchFamily="18" charset="0"/>
+              <a:cs typeface="Times New Roman" panose="02020603050405020304" pitchFamily="18" charset="0"/>
+            </a:endParaRPr>
+          </a:p>
+        </p:txBody>
+      </p:sp>
+      <p:pic>
+        <p:nvPicPr>
+          <p:cNvPr id="5" name="Picture 4">
+            <a:extLst>
+              <a:ext uri="{FF2B5EF4-FFF2-40B4-BE49-F238E27FC236}">
+                <a16:creationId xmlns:a16="http://schemas.microsoft.com/office/drawing/2014/main" id="{1F2B1FAB-5552-15B0-25D7-D19B0CB61C7D}"/>
+              </a:ext>
+            </a:extLst>
+          </p:cNvPr>
+          <p:cNvPicPr>
+            <a:picLocks noChangeAspect="1"/>
+          </p:cNvPicPr>
+          <p:nvPr/>
+        </p:nvPicPr>
+        <p:blipFill>
+          <a:blip r:embed="rId2"/>
+          <a:stretch>
+            <a:fillRect/>
+          </a:stretch>
+        </p:blipFill>
+        <p:spPr>
+          <a:xfrm>
+            <a:off x="7923276" y="0"/>
+            <a:ext cx="3813048" cy="6858000"/>
+          </a:xfrm>
+          <a:prstGeom prst="rect">
+            <a:avLst/>
+          </a:prstGeom>
+        </p:spPr>
+      </p:pic>
     </p:spTree>
     <p:extLst>
       <p:ext uri="{BB962C8B-B14F-4D97-AF65-F5344CB8AC3E}">
-        <p14:creationId xmlns:p14="http://schemas.microsoft.com/office/powerpoint/2010/main" val="3649366483"/>
+        <p14:creationId xmlns:p14="http://schemas.microsoft.com/office/powerpoint/2010/main" val="3556970642"/>
       </p:ext>
     </p:extLst>
   </p:cSld>
@@ -7572,7 +7607,7 @@
           <p:cNvPr id="2" name="Title 1">
             <a:extLst>
               <a:ext uri="{FF2B5EF4-FFF2-40B4-BE49-F238E27FC236}">
-                <a16:creationId xmlns:a16="http://schemas.microsoft.com/office/drawing/2014/main" id="{60B1C63A-38FF-B122-E130-3B3B86B6F9CF}"/>
+                <a16:creationId xmlns:a16="http://schemas.microsoft.com/office/drawing/2014/main" id="{01265544-4EE4-9947-C5BB-7F8ABDDC6138}"/>
               </a:ext>
             </a:extLst>
           </p:cNvPr>
@@ -7583,24 +7618,151 @@
             <p:ph type="title"/>
           </p:nvPr>
         </p:nvSpPr>
-        <p:spPr/>
+        <p:spPr>
+          <a:xfrm>
+            <a:off x="838200" y="365125"/>
+            <a:ext cx="6733949" cy="1325563"/>
+          </a:xfrm>
+        </p:spPr>
         <p:txBody>
           <a:bodyPr/>
           <a:lstStyle/>
           <a:p>
             <a:r>
+              <a:rPr lang="en-GB" dirty="0"/>
+              <a:t>Architecture Diagram</a:t>
+            </a:r>
+          </a:p>
+        </p:txBody>
+      </p:sp>
+      <p:sp>
+        <p:nvSpPr>
+          <p:cNvPr id="3" name="Content Placeholder 2">
+            <a:extLst>
+              <a:ext uri="{FF2B5EF4-FFF2-40B4-BE49-F238E27FC236}">
+                <a16:creationId xmlns:a16="http://schemas.microsoft.com/office/drawing/2014/main" id="{96D017E5-D3BB-147E-75F7-D5A6C35014E9}"/>
+              </a:ext>
+            </a:extLst>
+          </p:cNvPr>
+          <p:cNvSpPr>
+            <a:spLocks noGrp="1"/>
+          </p:cNvSpPr>
+          <p:nvPr>
+            <p:ph idx="1"/>
+          </p:nvPr>
+        </p:nvSpPr>
+        <p:spPr>
+          <a:xfrm>
+            <a:off x="838200" y="1825625"/>
+            <a:ext cx="6733949" cy="4351338"/>
+          </a:xfrm>
+        </p:spPr>
+        <p:txBody>
+          <a:bodyPr>
+            <a:normAutofit lnSpcReduction="10000"/>
+          </a:bodyPr>
+          <a:lstStyle/>
+          <a:p>
+            <a:pPr marL="514350" indent="-514350">
+              <a:buAutoNum type="arabicPeriod"/>
+            </a:pPr>
+            <a:r>
               <a:rPr lang="en-GB" dirty="0">
-                <a:latin typeface="Jumping Unicorn" panose="02000600000000000000" pitchFamily="2" charset="0"/>
-              </a:rPr>
-              <a:t>Demo</a:t>
-            </a:r>
-          </a:p>
-        </p:txBody>
-      </p:sp>
+                <a:latin typeface="Times New Roman" panose="02020603050405020304" pitchFamily="18" charset="0"/>
+                <a:cs typeface="Times New Roman" panose="02020603050405020304" pitchFamily="18" charset="0"/>
+              </a:rPr>
+              <a:t>The client sends a POST request with input data to the Flask app</a:t>
+            </a:r>
+          </a:p>
+          <a:p>
+            <a:pPr marL="514350" indent="-514350">
+              <a:buAutoNum type="arabicPeriod"/>
+            </a:pPr>
+            <a:r>
+              <a:rPr lang="en-GB" dirty="0">
+                <a:latin typeface="Times New Roman" panose="02020603050405020304" pitchFamily="18" charset="0"/>
+                <a:cs typeface="Times New Roman" panose="02020603050405020304" pitchFamily="18" charset="0"/>
+              </a:rPr>
+              <a:t>The Flask app processes the input data, scaling it for LR and GBM models to make predictions</a:t>
+            </a:r>
+          </a:p>
+          <a:p>
+            <a:pPr marL="514350" indent="-514350">
+              <a:buAutoNum type="arabicPeriod"/>
+            </a:pPr>
+            <a:r>
+              <a:rPr lang="en-GB" dirty="0">
+                <a:latin typeface="Times New Roman" panose="02020603050405020304" pitchFamily="18" charset="0"/>
+                <a:cs typeface="Times New Roman" panose="02020603050405020304" pitchFamily="18" charset="0"/>
+              </a:rPr>
+              <a:t>Flask app then uses LIME explainer to generate the explanation for the predictions</a:t>
+            </a:r>
+          </a:p>
+          <a:p>
+            <a:pPr marL="514350" indent="-514350">
+              <a:buAutoNum type="arabicPeriod"/>
+            </a:pPr>
+            <a:r>
+              <a:rPr lang="en-GB" dirty="0">
+                <a:latin typeface="Times New Roman" panose="02020603050405020304" pitchFamily="18" charset="0"/>
+                <a:cs typeface="Times New Roman" panose="02020603050405020304" pitchFamily="18" charset="0"/>
+              </a:rPr>
+              <a:t>The predictions and explanations are then returned to the client and displayed accordingly</a:t>
+            </a:r>
+          </a:p>
+        </p:txBody>
+      </p:sp>
+      <p:pic>
+        <p:nvPicPr>
+          <p:cNvPr id="1028" name="Picture 4">
+            <a:extLst>
+              <a:ext uri="{FF2B5EF4-FFF2-40B4-BE49-F238E27FC236}">
+                <a16:creationId xmlns:a16="http://schemas.microsoft.com/office/drawing/2014/main" id="{FDDAAFB1-1EB3-D59C-0D07-89B2598C8BBB}"/>
+              </a:ext>
+            </a:extLst>
+          </p:cNvPr>
+          <p:cNvPicPr>
+            <a:picLocks noChangeAspect="1" noChangeArrowheads="1"/>
+          </p:cNvPicPr>
+          <p:nvPr/>
+        </p:nvPicPr>
+        <p:blipFill>
+          <a:blip r:embed="rId2">
+            <a:extLst>
+              <a:ext uri="{28A0092B-C50C-407E-A947-70E740481C1C}">
+                <a14:useLocalDpi xmlns:a14="http://schemas.microsoft.com/office/drawing/2010/main" val="0"/>
+              </a:ext>
+            </a:extLst>
+          </a:blip>
+          <a:srcRect/>
+          <a:stretch>
+            <a:fillRect/>
+          </a:stretch>
+        </p:blipFill>
+        <p:spPr bwMode="auto">
+          <a:xfrm>
+            <a:off x="7572149" y="0"/>
+            <a:ext cx="4579937" cy="6858000"/>
+          </a:xfrm>
+          <a:prstGeom prst="rect">
+            <a:avLst/>
+          </a:prstGeom>
+          <a:noFill/>
+          <a:extLst>
+            <a:ext uri="{909E8E84-426E-40DD-AFC4-6F175D3DCCD1}">
+              <a14:hiddenFill xmlns:a14="http://schemas.microsoft.com/office/drawing/2010/main">
+                <a:solidFill>
+                  <a:srgbClr val="FFFFFF"/>
+                </a:solidFill>
+              </a14:hiddenFill>
+            </a:ext>
+          </a:extLst>
+        </p:spPr>
+      </p:pic>
     </p:spTree>
     <p:extLst>
       <p:ext uri="{BB962C8B-B14F-4D97-AF65-F5344CB8AC3E}">
-        <p14:creationId xmlns:p14="http://schemas.microsoft.com/office/powerpoint/2010/main" val="2965663008"/>
+        <p14:creationId xmlns:p14="http://schemas.microsoft.com/office/powerpoint/2010/main" val="3784593241"/>
       </p:ext>
     </p:extLst>
   </p:cSld>
@@ -7632,7 +7794,7 @@
           <p:cNvPr id="2" name="Title 1">
             <a:extLst>
               <a:ext uri="{FF2B5EF4-FFF2-40B4-BE49-F238E27FC236}">
-                <a16:creationId xmlns:a16="http://schemas.microsoft.com/office/drawing/2014/main" id="{CD2889CC-C1B7-42C9-9828-9DA02B2AD405}"/>
+                <a16:creationId xmlns:a16="http://schemas.microsoft.com/office/drawing/2014/main" id="{CC647BD7-D00C-5567-1079-7797A22A19CE}"/>
               </a:ext>
             </a:extLst>
           </p:cNvPr>
@@ -7643,52 +7805,149 @@
             <p:ph type="title"/>
           </p:nvPr>
         </p:nvSpPr>
-        <p:spPr/>
-        <p:txBody>
-          <a:bodyPr/>
-          <a:lstStyle/>
-          <a:p>
-            <a:r>
-              <a:rPr lang="en-GB" dirty="0">
-                <a:latin typeface="Jumping Unicorn" panose="02000600000000000000" pitchFamily="2" charset="0"/>
-              </a:rPr>
-              <a:t>Video Demo</a:t>
-            </a:r>
-          </a:p>
-        </p:txBody>
-      </p:sp>
-      <p:sp>
-        <p:nvSpPr>
-          <p:cNvPr id="3" name="Content Placeholder 2">
-            <a:extLst>
-              <a:ext uri="{FF2B5EF4-FFF2-40B4-BE49-F238E27FC236}">
-                <a16:creationId xmlns:a16="http://schemas.microsoft.com/office/drawing/2014/main" id="{A264D19B-4111-ECB5-597B-9E2A5D0DFE46}"/>
-              </a:ext>
-            </a:extLst>
-          </p:cNvPr>
-          <p:cNvSpPr>
-            <a:spLocks noGrp="1"/>
-          </p:cNvSpPr>
-          <p:nvPr>
-            <p:ph idx="1"/>
-          </p:nvPr>
-        </p:nvSpPr>
-        <p:spPr/>
-        <p:txBody>
-          <a:bodyPr/>
-          <a:lstStyle/>
-          <a:p>
-            <a:pPr marL="0" indent="0">
-              <a:buNone/>
-            </a:pPr>
-            <a:endParaRPr lang="en-GB" dirty="0"/>
-          </a:p>
-        </p:txBody>
-      </p:sp>
+        <p:spPr>
+          <a:xfrm>
+            <a:off x="839788" y="457200"/>
+            <a:ext cx="3932237" cy="530225"/>
+          </a:xfrm>
+        </p:spPr>
+        <p:txBody>
+          <a:bodyPr anchor="t">
+            <a:normAutofit fontScale="90000"/>
+          </a:bodyPr>
+          <a:lstStyle/>
+          <a:p>
+            <a:r>
+              <a:rPr lang="en-GB" dirty="0"/>
+              <a:t>UI and Visualisation</a:t>
+            </a:r>
+          </a:p>
+        </p:txBody>
+      </p:sp>
+      <p:pic>
+        <p:nvPicPr>
+          <p:cNvPr id="21" name="Picture 20">
+            <a:extLst>
+              <a:ext uri="{FF2B5EF4-FFF2-40B4-BE49-F238E27FC236}">
+                <a16:creationId xmlns:a16="http://schemas.microsoft.com/office/drawing/2014/main" id="{FE5D72EC-E5CD-19E2-D975-754E3E2CEC49}"/>
+              </a:ext>
+            </a:extLst>
+          </p:cNvPr>
+          <p:cNvPicPr>
+            <a:picLocks noChangeAspect="1"/>
+          </p:cNvPicPr>
+          <p:nvPr/>
+        </p:nvPicPr>
+        <p:blipFill>
+          <a:blip r:embed="rId2"/>
+          <a:stretch>
+            <a:fillRect/>
+          </a:stretch>
+        </p:blipFill>
+        <p:spPr>
+          <a:xfrm>
+            <a:off x="95778" y="1549899"/>
+            <a:ext cx="4893922" cy="3758202"/>
+          </a:xfrm>
+          <a:prstGeom prst="rect">
+            <a:avLst/>
+          </a:prstGeom>
+        </p:spPr>
+      </p:pic>
+      <p:pic>
+        <p:nvPicPr>
+          <p:cNvPr id="24" name="Picture 23">
+            <a:extLst>
+              <a:ext uri="{FF2B5EF4-FFF2-40B4-BE49-F238E27FC236}">
+                <a16:creationId xmlns:a16="http://schemas.microsoft.com/office/drawing/2014/main" id="{7013098A-9F09-EA59-5112-060214A41CAE}"/>
+              </a:ext>
+            </a:extLst>
+          </p:cNvPr>
+          <p:cNvPicPr>
+            <a:picLocks noChangeAspect="1"/>
+          </p:cNvPicPr>
+          <p:nvPr/>
+        </p:nvPicPr>
+        <p:blipFill>
+          <a:blip r:embed="rId3"/>
+          <a:stretch>
+            <a:fillRect/>
+          </a:stretch>
+        </p:blipFill>
+        <p:spPr>
+          <a:xfrm>
+            <a:off x="5226545" y="484495"/>
+            <a:ext cx="2962688" cy="3334215"/>
+          </a:xfrm>
+          <a:prstGeom prst="rect">
+            <a:avLst/>
+          </a:prstGeom>
+        </p:spPr>
+      </p:pic>
+      <p:pic>
+        <p:nvPicPr>
+          <p:cNvPr id="26" name="Picture 25">
+            <a:extLst>
+              <a:ext uri="{FF2B5EF4-FFF2-40B4-BE49-F238E27FC236}">
+                <a16:creationId xmlns:a16="http://schemas.microsoft.com/office/drawing/2014/main" id="{11080BC5-80DF-B832-BC1A-A4A34CCC67CC}"/>
+              </a:ext>
+            </a:extLst>
+          </p:cNvPr>
+          <p:cNvPicPr>
+            <a:picLocks noChangeAspect="1"/>
+          </p:cNvPicPr>
+          <p:nvPr/>
+        </p:nvPicPr>
+        <p:blipFill>
+          <a:blip r:embed="rId4"/>
+          <a:stretch>
+            <a:fillRect/>
+          </a:stretch>
+        </p:blipFill>
+        <p:spPr>
+          <a:xfrm>
+            <a:off x="7478033" y="3818710"/>
+            <a:ext cx="2594881" cy="2952480"/>
+          </a:xfrm>
+          <a:prstGeom prst="rect">
+            <a:avLst/>
+          </a:prstGeom>
+        </p:spPr>
+      </p:pic>
+      <p:pic>
+        <p:nvPicPr>
+          <p:cNvPr id="28" name="Picture 27">
+            <a:extLst>
+              <a:ext uri="{FF2B5EF4-FFF2-40B4-BE49-F238E27FC236}">
+                <a16:creationId xmlns:a16="http://schemas.microsoft.com/office/drawing/2014/main" id="{CF65D030-2177-19FD-3372-0441A63442D0}"/>
+              </a:ext>
+            </a:extLst>
+          </p:cNvPr>
+          <p:cNvPicPr>
+            <a:picLocks noChangeAspect="1"/>
+          </p:cNvPicPr>
+          <p:nvPr/>
+        </p:nvPicPr>
+        <p:blipFill>
+          <a:blip r:embed="rId5"/>
+          <a:stretch>
+            <a:fillRect/>
+          </a:stretch>
+        </p:blipFill>
+        <p:spPr>
+          <a:xfrm>
+            <a:off x="9104955" y="722312"/>
+            <a:ext cx="2991267" cy="3038899"/>
+          </a:xfrm>
+          <a:prstGeom prst="rect">
+            <a:avLst/>
+          </a:prstGeom>
+        </p:spPr>
+      </p:pic>
     </p:spTree>
     <p:extLst>
       <p:ext uri="{BB962C8B-B14F-4D97-AF65-F5344CB8AC3E}">
-        <p14:creationId xmlns:p14="http://schemas.microsoft.com/office/powerpoint/2010/main" val="2508217115"/>
+        <p14:creationId xmlns:p14="http://schemas.microsoft.com/office/powerpoint/2010/main" val="589582733"/>
       </p:ext>
     </p:extLst>
   </p:cSld>
@@ -8001,7 +8260,7 @@
           <p:cNvPr id="2" name="Title 1">
             <a:extLst>
               <a:ext uri="{FF2B5EF4-FFF2-40B4-BE49-F238E27FC236}">
-                <a16:creationId xmlns:a16="http://schemas.microsoft.com/office/drawing/2014/main" id="{DFC50F33-4F06-6D6A-A3A3-2E6DC603D574}"/>
+                <a16:creationId xmlns:a16="http://schemas.microsoft.com/office/drawing/2014/main" id="{60B1C63A-38FF-B122-E130-3B3B86B6F9CF}"/>
               </a:ext>
             </a:extLst>
           </p:cNvPr>
@@ -8021,7 +8280,7 @@
               <a:rPr lang="en-GB" dirty="0">
                 <a:latin typeface="Jumping Unicorn" panose="02000600000000000000" pitchFamily="2" charset="0"/>
               </a:rPr>
-              <a:t>Challenges and future improvements</a:t>
+              <a:t>Demo</a:t>
             </a:r>
           </a:p>
         </p:txBody>
@@ -8029,7 +8288,7 @@
     </p:spTree>
     <p:extLst>
       <p:ext uri="{BB962C8B-B14F-4D97-AF65-F5344CB8AC3E}">
-        <p14:creationId xmlns:p14="http://schemas.microsoft.com/office/powerpoint/2010/main" val="4212735330"/>
+        <p14:creationId xmlns:p14="http://schemas.microsoft.com/office/powerpoint/2010/main" val="2965663008"/>
       </p:ext>
     </p:extLst>
   </p:cSld>
@@ -8061,7 +8320,7 @@
           <p:cNvPr id="2" name="Title 1">
             <a:extLst>
               <a:ext uri="{FF2B5EF4-FFF2-40B4-BE49-F238E27FC236}">
-                <a16:creationId xmlns:a16="http://schemas.microsoft.com/office/drawing/2014/main" id="{0CADC0C9-8C4F-E760-D367-A726FD9204D8}"/>
+                <a16:creationId xmlns:a16="http://schemas.microsoft.com/office/drawing/2014/main" id="{CD2889CC-C1B7-42C9-9828-9DA02B2AD405}"/>
               </a:ext>
             </a:extLst>
           </p:cNvPr>
@@ -8081,7 +8340,7 @@
               <a:rPr lang="en-GB" dirty="0">
                 <a:latin typeface="Jumping Unicorn" panose="02000600000000000000" pitchFamily="2" charset="0"/>
               </a:rPr>
-              <a:t>Challenges</a:t>
+              <a:t>Video Demo</a:t>
             </a:r>
           </a:p>
         </p:txBody>
@@ -8091,15 +8350,15 @@
           <p:cNvPr id="3" name="Content Placeholder 2">
             <a:extLst>
               <a:ext uri="{FF2B5EF4-FFF2-40B4-BE49-F238E27FC236}">
-                <a16:creationId xmlns:a16="http://schemas.microsoft.com/office/drawing/2014/main" id="{85082A39-D889-A8DB-CA9F-CD3C7A3AA7AD}"/>
-              </a:ext>
-            </a:extLst>
-          </p:cNvPr>
-          <p:cNvSpPr>
-            <a:spLocks noGrp="1"/>
-          </p:cNvSpPr>
-          <p:nvPr>
-            <p:ph sz="half" idx="1"/>
+                <a16:creationId xmlns:a16="http://schemas.microsoft.com/office/drawing/2014/main" id="{A264D19B-4111-ECB5-597B-9E2A5D0DFE46}"/>
+              </a:ext>
+            </a:extLst>
+          </p:cNvPr>
+          <p:cNvSpPr>
+            <a:spLocks noGrp="1"/>
+          </p:cNvSpPr>
+          <p:nvPr>
+            <p:ph idx="1"/>
           </p:nvPr>
         </p:nvSpPr>
         <p:spPr/>
@@ -8107,31 +8366,9 @@
           <a:bodyPr/>
           <a:lstStyle/>
           <a:p>
-            <a:endParaRPr lang="en-GB" dirty="0"/>
-          </a:p>
-        </p:txBody>
-      </p:sp>
-      <p:sp>
-        <p:nvSpPr>
-          <p:cNvPr id="4" name="Content Placeholder 3">
-            <a:extLst>
-              <a:ext uri="{FF2B5EF4-FFF2-40B4-BE49-F238E27FC236}">
-                <a16:creationId xmlns:a16="http://schemas.microsoft.com/office/drawing/2014/main" id="{378B6130-6B0A-5D46-C51B-5E281F0927B1}"/>
-              </a:ext>
-            </a:extLst>
-          </p:cNvPr>
-          <p:cNvSpPr>
-            <a:spLocks noGrp="1"/>
-          </p:cNvSpPr>
-          <p:nvPr>
-            <p:ph sz="half" idx="2"/>
-          </p:nvPr>
-        </p:nvSpPr>
-        <p:spPr/>
-        <p:txBody>
-          <a:bodyPr/>
-          <a:lstStyle/>
-          <a:p>
+            <a:pPr marL="0" indent="0">
+              <a:buNone/>
+            </a:pPr>
             <a:endParaRPr lang="en-GB" dirty="0"/>
           </a:p>
         </p:txBody>
@@ -8139,7 +8376,7 @@
     </p:spTree>
     <p:extLst>
       <p:ext uri="{BB962C8B-B14F-4D97-AF65-F5344CB8AC3E}">
-        <p14:creationId xmlns:p14="http://schemas.microsoft.com/office/powerpoint/2010/main" val="3500278681"/>
+        <p14:creationId xmlns:p14="http://schemas.microsoft.com/office/powerpoint/2010/main" val="2508217115"/>
       </p:ext>
     </p:extLst>
   </p:cSld>
@@ -8171,6 +8408,176 @@
           <p:cNvPr id="2" name="Title 1">
             <a:extLst>
               <a:ext uri="{FF2B5EF4-FFF2-40B4-BE49-F238E27FC236}">
+                <a16:creationId xmlns:a16="http://schemas.microsoft.com/office/drawing/2014/main" id="{DFC50F33-4F06-6D6A-A3A3-2E6DC603D574}"/>
+              </a:ext>
+            </a:extLst>
+          </p:cNvPr>
+          <p:cNvSpPr>
+            <a:spLocks noGrp="1"/>
+          </p:cNvSpPr>
+          <p:nvPr>
+            <p:ph type="title"/>
+          </p:nvPr>
+        </p:nvSpPr>
+        <p:spPr/>
+        <p:txBody>
+          <a:bodyPr/>
+          <a:lstStyle/>
+          <a:p>
+            <a:r>
+              <a:rPr lang="en-GB" dirty="0">
+                <a:latin typeface="Jumping Unicorn" panose="02000600000000000000" pitchFamily="2" charset="0"/>
+              </a:rPr>
+              <a:t>Challenges and future improvements</a:t>
+            </a:r>
+          </a:p>
+        </p:txBody>
+      </p:sp>
+    </p:spTree>
+    <p:extLst>
+      <p:ext uri="{BB962C8B-B14F-4D97-AF65-F5344CB8AC3E}">
+        <p14:creationId xmlns:p14="http://schemas.microsoft.com/office/powerpoint/2010/main" val="4212735330"/>
+      </p:ext>
+    </p:extLst>
+  </p:cSld>
+  <p:clrMapOvr>
+    <a:masterClrMapping/>
+  </p:clrMapOvr>
+</p:sld>
+</file>
+
+<file path=ppt/slides/slide33.xml><?xml version="1.0" encoding="utf-8"?>
+<p:sld xmlns:a="http://schemas.openxmlformats.org/drawingml/2006/main" xmlns:r="http://schemas.openxmlformats.org/officeDocument/2006/relationships" xmlns:p="http://schemas.openxmlformats.org/presentationml/2006/main">
+  <p:cSld>
+    <p:spTree>
+      <p:nvGrpSpPr>
+        <p:cNvPr id="1" name=""/>
+        <p:cNvGrpSpPr/>
+        <p:nvPr/>
+      </p:nvGrpSpPr>
+      <p:grpSpPr>
+        <a:xfrm>
+          <a:off x="0" y="0"/>
+          <a:ext cx="0" cy="0"/>
+          <a:chOff x="0" y="0"/>
+          <a:chExt cx="0" cy="0"/>
+        </a:xfrm>
+      </p:grpSpPr>
+      <p:sp>
+        <p:nvSpPr>
+          <p:cNvPr id="2" name="Title 1">
+            <a:extLst>
+              <a:ext uri="{FF2B5EF4-FFF2-40B4-BE49-F238E27FC236}">
+                <a16:creationId xmlns:a16="http://schemas.microsoft.com/office/drawing/2014/main" id="{0CADC0C9-8C4F-E760-D367-A726FD9204D8}"/>
+              </a:ext>
+            </a:extLst>
+          </p:cNvPr>
+          <p:cNvSpPr>
+            <a:spLocks noGrp="1"/>
+          </p:cNvSpPr>
+          <p:nvPr>
+            <p:ph type="title"/>
+          </p:nvPr>
+        </p:nvSpPr>
+        <p:spPr/>
+        <p:txBody>
+          <a:bodyPr/>
+          <a:lstStyle/>
+          <a:p>
+            <a:r>
+              <a:rPr lang="en-GB" dirty="0">
+                <a:latin typeface="Jumping Unicorn" panose="02000600000000000000" pitchFamily="2" charset="0"/>
+              </a:rPr>
+              <a:t>Challenges</a:t>
+            </a:r>
+          </a:p>
+        </p:txBody>
+      </p:sp>
+      <p:sp>
+        <p:nvSpPr>
+          <p:cNvPr id="3" name="Content Placeholder 2">
+            <a:extLst>
+              <a:ext uri="{FF2B5EF4-FFF2-40B4-BE49-F238E27FC236}">
+                <a16:creationId xmlns:a16="http://schemas.microsoft.com/office/drawing/2014/main" id="{85082A39-D889-A8DB-CA9F-CD3C7A3AA7AD}"/>
+              </a:ext>
+            </a:extLst>
+          </p:cNvPr>
+          <p:cNvSpPr>
+            <a:spLocks noGrp="1"/>
+          </p:cNvSpPr>
+          <p:nvPr>
+            <p:ph sz="half" idx="1"/>
+          </p:nvPr>
+        </p:nvSpPr>
+        <p:spPr/>
+        <p:txBody>
+          <a:bodyPr/>
+          <a:lstStyle/>
+          <a:p>
+            <a:endParaRPr lang="en-GB" dirty="0"/>
+          </a:p>
+        </p:txBody>
+      </p:sp>
+      <p:sp>
+        <p:nvSpPr>
+          <p:cNvPr id="4" name="Content Placeholder 3">
+            <a:extLst>
+              <a:ext uri="{FF2B5EF4-FFF2-40B4-BE49-F238E27FC236}">
+                <a16:creationId xmlns:a16="http://schemas.microsoft.com/office/drawing/2014/main" id="{378B6130-6B0A-5D46-C51B-5E281F0927B1}"/>
+              </a:ext>
+            </a:extLst>
+          </p:cNvPr>
+          <p:cNvSpPr>
+            <a:spLocks noGrp="1"/>
+          </p:cNvSpPr>
+          <p:nvPr>
+            <p:ph sz="half" idx="2"/>
+          </p:nvPr>
+        </p:nvSpPr>
+        <p:spPr/>
+        <p:txBody>
+          <a:bodyPr/>
+          <a:lstStyle/>
+          <a:p>
+            <a:endParaRPr lang="en-GB" dirty="0"/>
+          </a:p>
+        </p:txBody>
+      </p:sp>
+    </p:spTree>
+    <p:extLst>
+      <p:ext uri="{BB962C8B-B14F-4D97-AF65-F5344CB8AC3E}">
+        <p14:creationId xmlns:p14="http://schemas.microsoft.com/office/powerpoint/2010/main" val="3500278681"/>
+      </p:ext>
+    </p:extLst>
+  </p:cSld>
+  <p:clrMapOvr>
+    <a:masterClrMapping/>
+  </p:clrMapOvr>
+</p:sld>
+</file>
+
+<file path=ppt/slides/slide34.xml><?xml version="1.0" encoding="utf-8"?>
+<p:sld xmlns:a="http://schemas.openxmlformats.org/drawingml/2006/main" xmlns:r="http://schemas.openxmlformats.org/officeDocument/2006/relationships" xmlns:p="http://schemas.openxmlformats.org/presentationml/2006/main">
+  <p:cSld>
+    <p:spTree>
+      <p:nvGrpSpPr>
+        <p:cNvPr id="1" name=""/>
+        <p:cNvGrpSpPr/>
+        <p:nvPr/>
+      </p:nvGrpSpPr>
+      <p:grpSpPr>
+        <a:xfrm>
+          <a:off x="0" y="0"/>
+          <a:ext cx="0" cy="0"/>
+          <a:chOff x="0" y="0"/>
+          <a:chExt cx="0" cy="0"/>
+        </a:xfrm>
+      </p:grpSpPr>
+      <p:sp>
+        <p:nvSpPr>
+          <p:cNvPr id="2" name="Title 1">
+            <a:extLst>
+              <a:ext uri="{FF2B5EF4-FFF2-40B4-BE49-F238E27FC236}">
                 <a16:creationId xmlns:a16="http://schemas.microsoft.com/office/drawing/2014/main" id="{D7184DDB-7DDC-1EB1-2BAC-FE421A32497B}"/>
               </a:ext>
             </a:extLst>
@@ -8259,7 +8666,7 @@
 </p:sld>
 </file>
 
-<file path=ppt/slides/slide33.xml><?xml version="1.0" encoding="utf-8"?>
+<file path=ppt/slides/slide35.xml><?xml version="1.0" encoding="utf-8"?>
 <p:sld xmlns:a="http://schemas.openxmlformats.org/drawingml/2006/main" xmlns:r="http://schemas.openxmlformats.org/officeDocument/2006/relationships" xmlns:p="http://schemas.openxmlformats.org/presentationml/2006/main">
   <p:cSld>
     <p:spTree>

</xml_diff>

<commit_message>
updated poster for feb deadline and added more raw diagram files to repo
</commit_message>
<xml_diff>
--- a/Diabetes Prediction with Machine Learning (ML).pptx
+++ b/Diabetes Prediction with Machine Learning (ML).pptx
@@ -520,7 +520,7 @@
           <a:p>
             <a:fld id="{4F162202-4602-4A80-AA5A-C601C1519D47}" type="datetimeFigureOut">
               <a:rPr lang="en-GB" smtClean="0"/>
-              <a:t>17/02/2025</a:t>
+              <a:t>21/02/2025</a:t>
             </a:fld>
             <a:endParaRPr lang="en-GB"/>
           </a:p>
@@ -1189,7 +1189,7 @@
           <a:p>
             <a:fld id="{AF8979C9-B5CC-471D-815B-CFB8B5F67837}" type="datetimeFigureOut">
               <a:rPr lang="en-GB" smtClean="0"/>
-              <a:t>17/02/2025</a:t>
+              <a:t>21/02/2025</a:t>
             </a:fld>
             <a:endParaRPr lang="en-GB"/>
           </a:p>
@@ -1389,7 +1389,7 @@
           <a:p>
             <a:fld id="{AF8979C9-B5CC-471D-815B-CFB8B5F67837}" type="datetimeFigureOut">
               <a:rPr lang="en-GB" smtClean="0"/>
-              <a:t>17/02/2025</a:t>
+              <a:t>21/02/2025</a:t>
             </a:fld>
             <a:endParaRPr lang="en-GB"/>
           </a:p>
@@ -1599,7 +1599,7 @@
           <a:p>
             <a:fld id="{AF8979C9-B5CC-471D-815B-CFB8B5F67837}" type="datetimeFigureOut">
               <a:rPr lang="en-GB" smtClean="0"/>
-              <a:t>17/02/2025</a:t>
+              <a:t>21/02/2025</a:t>
             </a:fld>
             <a:endParaRPr lang="en-GB"/>
           </a:p>
@@ -1799,7 +1799,7 @@
           <a:p>
             <a:fld id="{AF8979C9-B5CC-471D-815B-CFB8B5F67837}" type="datetimeFigureOut">
               <a:rPr lang="en-GB" smtClean="0"/>
-              <a:t>17/02/2025</a:t>
+              <a:t>21/02/2025</a:t>
             </a:fld>
             <a:endParaRPr lang="en-GB"/>
           </a:p>
@@ -2075,7 +2075,7 @@
           <a:p>
             <a:fld id="{AF8979C9-B5CC-471D-815B-CFB8B5F67837}" type="datetimeFigureOut">
               <a:rPr lang="en-GB" smtClean="0"/>
-              <a:t>17/02/2025</a:t>
+              <a:t>21/02/2025</a:t>
             </a:fld>
             <a:endParaRPr lang="en-GB"/>
           </a:p>
@@ -2343,7 +2343,7 @@
           <a:p>
             <a:fld id="{AF8979C9-B5CC-471D-815B-CFB8B5F67837}" type="datetimeFigureOut">
               <a:rPr lang="en-GB" smtClean="0"/>
-              <a:t>17/02/2025</a:t>
+              <a:t>21/02/2025</a:t>
             </a:fld>
             <a:endParaRPr lang="en-GB"/>
           </a:p>
@@ -2758,7 +2758,7 @@
           <a:p>
             <a:fld id="{AF8979C9-B5CC-471D-815B-CFB8B5F67837}" type="datetimeFigureOut">
               <a:rPr lang="en-GB" smtClean="0"/>
-              <a:t>17/02/2025</a:t>
+              <a:t>21/02/2025</a:t>
             </a:fld>
             <a:endParaRPr lang="en-GB"/>
           </a:p>
@@ -2900,7 +2900,7 @@
           <a:p>
             <a:fld id="{AF8979C9-B5CC-471D-815B-CFB8B5F67837}" type="datetimeFigureOut">
               <a:rPr lang="en-GB" smtClean="0"/>
-              <a:t>17/02/2025</a:t>
+              <a:t>21/02/2025</a:t>
             </a:fld>
             <a:endParaRPr lang="en-GB"/>
           </a:p>
@@ -3013,7 +3013,7 @@
           <a:p>
             <a:fld id="{AF8979C9-B5CC-471D-815B-CFB8B5F67837}" type="datetimeFigureOut">
               <a:rPr lang="en-GB" smtClean="0"/>
-              <a:t>17/02/2025</a:t>
+              <a:t>21/02/2025</a:t>
             </a:fld>
             <a:endParaRPr lang="en-GB"/>
           </a:p>
@@ -3326,7 +3326,7 @@
           <a:p>
             <a:fld id="{AF8979C9-B5CC-471D-815B-CFB8B5F67837}" type="datetimeFigureOut">
               <a:rPr lang="en-GB" smtClean="0"/>
-              <a:t>17/02/2025</a:t>
+              <a:t>21/02/2025</a:t>
             </a:fld>
             <a:endParaRPr lang="en-GB"/>
           </a:p>
@@ -3615,7 +3615,7 @@
           <a:p>
             <a:fld id="{AF8979C9-B5CC-471D-815B-CFB8B5F67837}" type="datetimeFigureOut">
               <a:rPr lang="en-GB" smtClean="0"/>
-              <a:t>17/02/2025</a:t>
+              <a:t>21/02/2025</a:t>
             </a:fld>
             <a:endParaRPr lang="en-GB"/>
           </a:p>
@@ -3858,7 +3858,7 @@
           <a:p>
             <a:fld id="{AF8979C9-B5CC-471D-815B-CFB8B5F67837}" type="datetimeFigureOut">
               <a:rPr lang="en-GB" smtClean="0"/>
-              <a:t>17/02/2025</a:t>
+              <a:t>21/02/2025</a:t>
             </a:fld>
             <a:endParaRPr lang="en-GB"/>
           </a:p>
@@ -7846,7 +7846,7 @@
         </p:blipFill>
         <p:spPr>
           <a:xfrm>
-            <a:off x="95778" y="1549899"/>
+            <a:off x="332623" y="1549899"/>
             <a:ext cx="4893922" cy="3758202"/>
           </a:xfrm>
           <a:prstGeom prst="rect">

</xml_diff>